<commit_message>
more work on the presentation
</commit_message>
<xml_diff>
--- a/Reports n such/Week 11 Presentation.pptx
+++ b/Reports n such/Week 11 Presentation.pptx
@@ -5,7 +5,7 @@
     <p:sldMasterId id="2147483648" r:id="rId1"/>
   </p:sldMasterIdLst>
   <p:notesMasterIdLst>
-    <p:notesMasterId r:id="rId12"/>
+    <p:notesMasterId r:id="rId13"/>
   </p:notesMasterIdLst>
   <p:sldIdLst>
     <p:sldId id="256" r:id="rId2"/>
@@ -17,7 +17,8 @@
     <p:sldId id="263" r:id="rId8"/>
     <p:sldId id="264" r:id="rId9"/>
     <p:sldId id="265" r:id="rId10"/>
-    <p:sldId id="261" r:id="rId11"/>
+    <p:sldId id="266" r:id="rId11"/>
+    <p:sldId id="267" r:id="rId12"/>
   </p:sldIdLst>
   <p:sldSz cx="12192000" cy="6858000"/>
   <p:notesSz cx="6858000" cy="9144000"/>
@@ -127,7 +128,7 @@
 <file path=ppt/revisionInfo.xml><?xml version="1.0" encoding="utf-8"?>
 <p1510:revInfo xmlns:a="http://schemas.openxmlformats.org/drawingml/2006/main" xmlns:r="http://schemas.openxmlformats.org/officeDocument/2006/relationships" xmlns:p1510="http://schemas.microsoft.com/office/powerpoint/2015/10/main">
   <p1510:revLst>
-    <p1510:client id="{5D77B04D-72D2-4F2E-9530-A9549410DFC4}" v="30" dt="2020-12-09T19:11:10.101"/>
+    <p1510:client id="{5D77B04D-72D2-4F2E-9530-A9549410DFC4}" v="34" dt="2020-12-09T21:31:42.578"/>
     <p1510:client id="{7FE71261-8415-4483-9A11-613A7C3B7AF9}" v="1" dt="2020-12-09T15:02:00.828"/>
   </p1510:revLst>
 </p1510:revInfo>
@@ -137,8 +138,8 @@
 <pc:chgInfo xmlns:a="http://schemas.openxmlformats.org/drawingml/2006/main" xmlns:r="http://schemas.openxmlformats.org/officeDocument/2006/relationships" xmlns:ac="http://schemas.microsoft.com/office/drawing/2013/main/command" xmlns:pc="http://schemas.microsoft.com/office/powerpoint/2013/main/command">
   <pc:docChgLst>
     <pc:chgData name="Lowe, Rachel M" userId="93b75d29-27f6-4dab-b540-bade7f33a1ad" providerId="ADAL" clId="{5D77B04D-72D2-4F2E-9530-A9549410DFC4}"/>
-    <pc:docChg chg="undo custSel mod addSld modSld">
-      <pc:chgData name="Lowe, Rachel M" userId="93b75d29-27f6-4dab-b540-bade7f33a1ad" providerId="ADAL" clId="{5D77B04D-72D2-4F2E-9530-A9549410DFC4}" dt="2020-12-09T19:11:46.010" v="5561" actId="20577"/>
+    <pc:docChg chg="undo custSel mod addSld delSld modSld">
+      <pc:chgData name="Lowe, Rachel M" userId="93b75d29-27f6-4dab-b540-bade7f33a1ad" providerId="ADAL" clId="{5D77B04D-72D2-4F2E-9530-A9549410DFC4}" dt="2020-12-09T21:42:32.836" v="7324" actId="20577"/>
       <pc:docMkLst>
         <pc:docMk/>
       </pc:docMkLst>
@@ -265,8 +266,8 @@
           </ac:picMkLst>
         </pc:picChg>
       </pc:sldChg>
-      <pc:sldChg chg="modSp add">
-        <pc:chgData name="Lowe, Rachel M" userId="93b75d29-27f6-4dab-b540-bade7f33a1ad" providerId="ADAL" clId="{5D77B04D-72D2-4F2E-9530-A9549410DFC4}" dt="2020-12-09T18:46:01.776" v="3747" actId="20577"/>
+      <pc:sldChg chg="modSp add del">
+        <pc:chgData name="Lowe, Rachel M" userId="93b75d29-27f6-4dab-b540-bade7f33a1ad" providerId="ADAL" clId="{5D77B04D-72D2-4F2E-9530-A9549410DFC4}" dt="2020-12-09T20:23:54.922" v="6098" actId="2696"/>
         <pc:sldMkLst>
           <pc:docMk/>
           <pc:sldMk cId="3043584120" sldId="261"/>
@@ -446,7 +447,7 @@
         </pc:picChg>
       </pc:sldChg>
       <pc:sldChg chg="addSp delSp modSp add">
-        <pc:chgData name="Lowe, Rachel M" userId="93b75d29-27f6-4dab-b540-bade7f33a1ad" providerId="ADAL" clId="{5D77B04D-72D2-4F2E-9530-A9549410DFC4}" dt="2020-12-09T19:11:46.010" v="5561" actId="20577"/>
+        <pc:chgData name="Lowe, Rachel M" userId="93b75d29-27f6-4dab-b540-bade7f33a1ad" providerId="ADAL" clId="{5D77B04D-72D2-4F2E-9530-A9549410DFC4}" dt="2020-12-09T20:23:42.419" v="6097" actId="207"/>
         <pc:sldMkLst>
           <pc:docMk/>
           <pc:sldMk cId="4263264427" sldId="265"/>
@@ -460,7 +461,7 @@
           </ac:spMkLst>
         </pc:spChg>
         <pc:spChg chg="mod">
-          <ac:chgData name="Lowe, Rachel M" userId="93b75d29-27f6-4dab-b540-bade7f33a1ad" providerId="ADAL" clId="{5D77B04D-72D2-4F2E-9530-A9549410DFC4}" dt="2020-12-09T19:11:46.010" v="5561" actId="20577"/>
+          <ac:chgData name="Lowe, Rachel M" userId="93b75d29-27f6-4dab-b540-bade7f33a1ad" providerId="ADAL" clId="{5D77B04D-72D2-4F2E-9530-A9549410DFC4}" dt="2020-12-09T20:23:42.419" v="6097" actId="207"/>
           <ac:spMkLst>
             <pc:docMk/>
             <pc:sldMk cId="4263264427" sldId="265"/>
@@ -507,6 +508,52 @@
             <ac:picMk id="9" creationId="{0B3E1D3B-AC8E-4323-9C7D-02A69BEE5C00}"/>
           </ac:picMkLst>
         </pc:picChg>
+      </pc:sldChg>
+      <pc:sldChg chg="modSp add">
+        <pc:chgData name="Lowe, Rachel M" userId="93b75d29-27f6-4dab-b540-bade7f33a1ad" providerId="ADAL" clId="{5D77B04D-72D2-4F2E-9530-A9549410DFC4}" dt="2020-12-09T21:31:38.680" v="6774" actId="20577"/>
+        <pc:sldMkLst>
+          <pc:docMk/>
+          <pc:sldMk cId="3592387767" sldId="266"/>
+        </pc:sldMkLst>
+        <pc:spChg chg="mod">
+          <ac:chgData name="Lowe, Rachel M" userId="93b75d29-27f6-4dab-b540-bade7f33a1ad" providerId="ADAL" clId="{5D77B04D-72D2-4F2E-9530-A9549410DFC4}" dt="2020-12-09T20:32:58.027" v="6112" actId="20577"/>
+          <ac:spMkLst>
+            <pc:docMk/>
+            <pc:sldMk cId="3592387767" sldId="266"/>
+            <ac:spMk id="2" creationId="{900CA5E2-07C2-4322-9C5C-019DF11286FA}"/>
+          </ac:spMkLst>
+        </pc:spChg>
+        <pc:spChg chg="mod">
+          <ac:chgData name="Lowe, Rachel M" userId="93b75d29-27f6-4dab-b540-bade7f33a1ad" providerId="ADAL" clId="{5D77B04D-72D2-4F2E-9530-A9549410DFC4}" dt="2020-12-09T21:31:38.680" v="6774" actId="20577"/>
+          <ac:spMkLst>
+            <pc:docMk/>
+            <pc:sldMk cId="3592387767" sldId="266"/>
+            <ac:spMk id="3" creationId="{274A393C-BE36-477B-B73F-F1BE41283104}"/>
+          </ac:spMkLst>
+        </pc:spChg>
+      </pc:sldChg>
+      <pc:sldChg chg="modSp add">
+        <pc:chgData name="Lowe, Rachel M" userId="93b75d29-27f6-4dab-b540-bade7f33a1ad" providerId="ADAL" clId="{5D77B04D-72D2-4F2E-9530-A9549410DFC4}" dt="2020-12-09T21:42:32.836" v="7324" actId="20577"/>
+        <pc:sldMkLst>
+          <pc:docMk/>
+          <pc:sldMk cId="1407993548" sldId="267"/>
+        </pc:sldMkLst>
+        <pc:spChg chg="mod">
+          <ac:chgData name="Lowe, Rachel M" userId="93b75d29-27f6-4dab-b540-bade7f33a1ad" providerId="ADAL" clId="{5D77B04D-72D2-4F2E-9530-A9549410DFC4}" dt="2020-12-09T21:31:46.970" v="6796" actId="20577"/>
+          <ac:spMkLst>
+            <pc:docMk/>
+            <pc:sldMk cId="1407993548" sldId="267"/>
+            <ac:spMk id="2" creationId="{4DFD4C04-3E24-4D64-BE9F-77A551E9B82D}"/>
+          </ac:spMkLst>
+        </pc:spChg>
+        <pc:spChg chg="mod">
+          <ac:chgData name="Lowe, Rachel M" userId="93b75d29-27f6-4dab-b540-bade7f33a1ad" providerId="ADAL" clId="{5D77B04D-72D2-4F2E-9530-A9549410DFC4}" dt="2020-12-09T21:42:32.836" v="7324" actId="20577"/>
+          <ac:spMkLst>
+            <pc:docMk/>
+            <pc:sldMk cId="1407993548" sldId="267"/>
+            <ac:spMk id="3" creationId="{4CC78CDA-6BE5-4C7C-B34C-FA9DAC268A12}"/>
+          </ac:spMkLst>
+        </pc:spChg>
       </pc:sldChg>
     </pc:docChg>
   </pc:docChgLst>
@@ -4332,7 +4379,7 @@
           <p:cNvPr id="2" name="Title 1">
             <a:extLst>
               <a:ext uri="{FF2B5EF4-FFF2-40B4-BE49-F238E27FC236}">
-                <a16:creationId xmlns:a16="http://schemas.microsoft.com/office/drawing/2014/main" id="{C5B8DC9B-72A3-4E6A-A56E-86446BA4A64D}"/>
+                <a16:creationId xmlns:a16="http://schemas.microsoft.com/office/drawing/2014/main" id="{900CA5E2-07C2-4322-9C5C-019DF11286FA}"/>
               </a:ext>
             </a:extLst>
           </p:cNvPr>
@@ -4350,7 +4397,7 @@
           <a:p>
             <a:r>
               <a:rPr lang="en-GB" dirty="0"/>
-              <a:t>The HECCIN Game</a:t>
+              <a:t>Usage of Jira</a:t>
             </a:r>
           </a:p>
         </p:txBody>
@@ -4360,7 +4407,7 @@
           <p:cNvPr id="3" name="Content Placeholder 2">
             <a:extLst>
               <a:ext uri="{FF2B5EF4-FFF2-40B4-BE49-F238E27FC236}">
-                <a16:creationId xmlns:a16="http://schemas.microsoft.com/office/drawing/2014/main" id="{1A9D438D-1CB4-4266-915D-2053AC29ABA2}"/>
+                <a16:creationId xmlns:a16="http://schemas.microsoft.com/office/drawing/2014/main" id="{274A393C-BE36-477B-B73F-F1BE41283104}"/>
               </a:ext>
             </a:extLst>
           </p:cNvPr>
@@ -4377,19 +4424,62 @@
           <a:lstStyle/>
           <a:p>
             <a:r>
+              <a:rPr lang="en-GB" dirty="0"/>
+              <a:t>276 hours in total logged on Jira (as of 9/12/2020)</a:t>
+            </a:r>
+          </a:p>
+          <a:p>
+            <a:r>
+              <a:rPr lang="en-GB" dirty="0"/>
+              <a:t>Splitting big tasks into subtasks</a:t>
+            </a:r>
+          </a:p>
+          <a:p>
+            <a:pPr lvl="1"/>
+            <a:r>
+              <a:rPr lang="en-GB" dirty="0"/>
+              <a:t>Although, for OH-HECC, I </a:t>
+            </a:r>
+            <a:r>
               <a:rPr lang="en-GB" dirty="0" err="1"/>
-              <a:t>Hecc</a:t>
+              <a:t>kinda</a:t>
             </a:r>
             <a:r>
               <a:rPr lang="en-GB" dirty="0"/>
-              <a:t>-Infused Nice Game</a:t>
+              <a:t> forgot to mark the first subtask as done and I basically logged all the work for that under that singular subtask</a:t>
+            </a:r>
+          </a:p>
+          <a:p>
+            <a:r>
+              <a:rPr lang="en-GB" dirty="0"/>
+              <a:t>Some use of releases</a:t>
             </a:r>
           </a:p>
           <a:p>
             <a:pPr lvl="1"/>
             <a:r>
               <a:rPr lang="en-GB" dirty="0"/>
-              <a:t>Nice indicates that ‘oh nice you used HECC-IT to make this that’s cool’.</a:t>
+              <a:t>Summer prep work was filed away into a release</a:t>
+            </a:r>
+          </a:p>
+          <a:p>
+            <a:pPr lvl="1"/>
+            <a:r>
+              <a:rPr lang="en-GB" dirty="0"/>
+              <a:t>Challenge Week work was filed away into a release</a:t>
+            </a:r>
+          </a:p>
+          <a:p>
+            <a:pPr lvl="1"/>
+            <a:r>
+              <a:rPr lang="en-GB" dirty="0"/>
+              <a:t>This term’s work will be filed away into a release too</a:t>
+            </a:r>
+          </a:p>
+          <a:p>
+            <a:r>
+              <a:rPr lang="en-GB" dirty="0"/>
+              <a:t>Bugs etc. reported on Jira as well</a:t>
             </a:r>
           </a:p>
         </p:txBody>
@@ -4397,7 +4487,144 @@
     </p:spTree>
     <p:extLst>
       <p:ext uri="{BB962C8B-B14F-4D97-AF65-F5344CB8AC3E}">
-        <p14:creationId xmlns:p14="http://schemas.microsoft.com/office/powerpoint/2010/main" val="3043584120"/>
+        <p14:creationId xmlns:p14="http://schemas.microsoft.com/office/powerpoint/2010/main" val="3592387767"/>
+      </p:ext>
+    </p:extLst>
+  </p:cSld>
+  <p:clrMapOvr>
+    <a:masterClrMapping/>
+  </p:clrMapOvr>
+</p:sld>
+</file>
+
+<file path=ppt/slides/slide11.xml><?xml version="1.0" encoding="utf-8"?>
+<p:sld xmlns:a="http://schemas.openxmlformats.org/drawingml/2006/main" xmlns:r="http://schemas.openxmlformats.org/officeDocument/2006/relationships" xmlns:p="http://schemas.openxmlformats.org/presentationml/2006/main">
+  <p:cSld>
+    <p:spTree>
+      <p:nvGrpSpPr>
+        <p:cNvPr id="1" name=""/>
+        <p:cNvGrpSpPr/>
+        <p:nvPr/>
+      </p:nvGrpSpPr>
+      <p:grpSpPr>
+        <a:xfrm>
+          <a:off x="0" y="0"/>
+          <a:ext cx="0" cy="0"/>
+          <a:chOff x="0" y="0"/>
+          <a:chExt cx="0" cy="0"/>
+        </a:xfrm>
+      </p:grpSpPr>
+      <p:sp>
+        <p:nvSpPr>
+          <p:cNvPr id="2" name="Title 1">
+            <a:extLst>
+              <a:ext uri="{FF2B5EF4-FFF2-40B4-BE49-F238E27FC236}">
+                <a16:creationId xmlns:a16="http://schemas.microsoft.com/office/drawing/2014/main" id="{4DFD4C04-3E24-4D64-BE9F-77A551E9B82D}"/>
+              </a:ext>
+            </a:extLst>
+          </p:cNvPr>
+          <p:cNvSpPr>
+            <a:spLocks noGrp="1"/>
+          </p:cNvSpPr>
+          <p:nvPr>
+            <p:ph type="title"/>
+          </p:nvPr>
+        </p:nvSpPr>
+        <p:spPr/>
+        <p:txBody>
+          <a:bodyPr/>
+          <a:lstStyle/>
+          <a:p>
+            <a:r>
+              <a:rPr lang="en-GB" dirty="0"/>
+              <a:t>Usage of </a:t>
+            </a:r>
+            <a:r>
+              <a:rPr lang="en-GB" dirty="0" err="1"/>
+              <a:t>gitlab</a:t>
+            </a:r>
+            <a:endParaRPr lang="en-GB" dirty="0"/>
+          </a:p>
+        </p:txBody>
+      </p:sp>
+      <p:sp>
+        <p:nvSpPr>
+          <p:cNvPr id="3" name="Content Placeholder 2">
+            <a:extLst>
+              <a:ext uri="{FF2B5EF4-FFF2-40B4-BE49-F238E27FC236}">
+                <a16:creationId xmlns:a16="http://schemas.microsoft.com/office/drawing/2014/main" id="{4CC78CDA-6BE5-4C7C-B34C-FA9DAC268A12}"/>
+              </a:ext>
+            </a:extLst>
+          </p:cNvPr>
+          <p:cNvSpPr>
+            <a:spLocks noGrp="1"/>
+          </p:cNvSpPr>
+          <p:nvPr>
+            <p:ph idx="1"/>
+          </p:nvPr>
+        </p:nvSpPr>
+        <p:spPr/>
+        <p:txBody>
+          <a:bodyPr/>
+          <a:lstStyle/>
+          <a:p>
+            <a:r>
+              <a:rPr lang="en-GB" dirty="0"/>
+              <a:t>Everything’s on my </a:t>
+            </a:r>
+            <a:r>
+              <a:rPr lang="en-GB" dirty="0" err="1"/>
+              <a:t>gitlab</a:t>
+            </a:r>
+            <a:r>
+              <a:rPr lang="en-GB" dirty="0"/>
+              <a:t> repo</a:t>
+            </a:r>
+          </a:p>
+          <a:p>
+            <a:pPr lvl="1"/>
+            <a:r>
+              <a:rPr lang="en-GB" dirty="0"/>
+              <a:t>153 commits as of 9/12/20</a:t>
+            </a:r>
+          </a:p>
+          <a:p>
+            <a:r>
+              <a:rPr lang="en-GB" dirty="0"/>
+              <a:t>Technical documentation for the project itself is available on the repo</a:t>
+            </a:r>
+          </a:p>
+          <a:p>
+            <a:pPr lvl="1"/>
+            <a:r>
+              <a:rPr lang="en-GB" dirty="0"/>
+              <a:t>See the ‘Technical Documentation’ folder (auto-generated via Javadoc comments in the source code)</a:t>
+            </a:r>
+          </a:p>
+          <a:p>
+            <a:r>
+              <a:rPr lang="en-GB" dirty="0"/>
+              <a:t>Mainly used branches as archives of the project at certain points in time</a:t>
+            </a:r>
+          </a:p>
+          <a:p>
+            <a:pPr lvl="1"/>
+            <a:r>
+              <a:rPr lang="en-GB" dirty="0"/>
+              <a:t>End of summer, end of challenge week, after </a:t>
+            </a:r>
+            <a:r>
+              <a:rPr lang="en-GB"/>
+              <a:t>this term, etc.</a:t>
+            </a:r>
+            <a:endParaRPr lang="en-GB" dirty="0"/>
+          </a:p>
+        </p:txBody>
+      </p:sp>
+    </p:spTree>
+    <p:extLst>
+      <p:ext uri="{BB962C8B-B14F-4D97-AF65-F5344CB8AC3E}">
+        <p14:creationId xmlns:p14="http://schemas.microsoft.com/office/powerpoint/2010/main" val="1407993548"/>
       </p:ext>
     </p:extLst>
   </p:cSld>
@@ -5925,7 +6152,7 @@
         <p:spPr>
           <a:xfrm>
             <a:off x="804997" y="2272143"/>
-            <a:ext cx="4706803" cy="3788830"/>
+            <a:ext cx="4803636" cy="3788830"/>
           </a:xfrm>
         </p:spPr>
         <p:txBody>
@@ -5942,11 +6169,147 @@
               </a:rPr>
               <a:t>A hypertext game.</a:t>
             </a:r>
-            <a:endParaRPr lang="en-US" sz="1800" dirty="0">
+          </a:p>
+          <a:p>
+            <a:r>
+              <a:rPr lang="en-US" sz="2000" dirty="0">
+                <a:solidFill>
+                  <a:srgbClr val="000000"/>
+                </a:solidFill>
+              </a:rPr>
+              <a:t>3 parts</a:t>
+            </a:r>
+          </a:p>
+          <a:p>
+            <a:pPr lvl="1"/>
+            <a:r>
+              <a:rPr lang="en-US" sz="1800" dirty="0">
+                <a:solidFill>
+                  <a:srgbClr val="000000"/>
+                </a:solidFill>
+              </a:rPr>
+              <a:t>Index.html</a:t>
+            </a:r>
+          </a:p>
+          <a:p>
+            <a:pPr lvl="2"/>
+            <a:r>
+              <a:rPr lang="en-US" sz="1800" dirty="0">
+                <a:solidFill>
+                  <a:srgbClr val="000000"/>
+                </a:solidFill>
+              </a:rPr>
+              <a:t>Baked into HECC-UP, players see this.</a:t>
+            </a:r>
+          </a:p>
+          <a:p>
+            <a:pPr lvl="1"/>
+            <a:r>
+              <a:rPr lang="en-US" sz="1800" dirty="0">
+                <a:solidFill>
+                  <a:srgbClr val="000000"/>
+                </a:solidFill>
+              </a:rPr>
+              <a:t>heccer.js</a:t>
+            </a:r>
+            <a:endParaRPr lang="en-US" sz="1400" dirty="0">
               <a:solidFill>
                 <a:srgbClr val="000000"/>
               </a:solidFill>
             </a:endParaRPr>
+          </a:p>
+          <a:p>
+            <a:pPr lvl="2"/>
+            <a:r>
+              <a:rPr lang="en-US" sz="1800" i="1" dirty="0">
+                <a:solidFill>
+                  <a:schemeClr val="tx1">
+                    <a:lumMod val="65000"/>
+                    <a:lumOff val="35000"/>
+                  </a:schemeClr>
+                </a:solidFill>
+              </a:rPr>
+              <a:t>HECC Environment for Runtime</a:t>
+            </a:r>
+          </a:p>
+          <a:p>
+            <a:pPr lvl="2"/>
+            <a:r>
+              <a:rPr lang="en-US" sz="1800" dirty="0">
+                <a:solidFill>
+                  <a:srgbClr val="000000"/>
+                </a:solidFill>
+              </a:rPr>
+              <a:t>Baked into HECC-UP, finite state machine for the passages</a:t>
+            </a:r>
+          </a:p>
+          <a:p>
+            <a:pPr lvl="1"/>
+            <a:r>
+              <a:rPr lang="en-US" sz="1800" dirty="0">
+                <a:solidFill>
+                  <a:srgbClr val="000000"/>
+                </a:solidFill>
+              </a:rPr>
+              <a:t>hecced.js</a:t>
+            </a:r>
+          </a:p>
+          <a:p>
+            <a:pPr lvl="2"/>
+            <a:r>
+              <a:rPr lang="en-US" sz="1800" i="1" dirty="0">
+                <a:solidFill>
+                  <a:schemeClr val="tx1">
+                    <a:lumMod val="65000"/>
+                    <a:lumOff val="35000"/>
+                  </a:schemeClr>
+                </a:solidFill>
+              </a:rPr>
+              <a:t>HECC Exported Data</a:t>
+            </a:r>
+          </a:p>
+          <a:p>
+            <a:pPr lvl="2"/>
+            <a:r>
+              <a:rPr lang="en-US" sz="1800" dirty="0">
+                <a:solidFill>
+                  <a:srgbClr val="000000"/>
+                </a:solidFill>
+              </a:rPr>
+              <a:t>Generated from the .</a:t>
+            </a:r>
+            <a:r>
+              <a:rPr lang="en-US" sz="1800" dirty="0" err="1">
+                <a:solidFill>
+                  <a:srgbClr val="000000"/>
+                </a:solidFill>
+              </a:rPr>
+              <a:t>hecc</a:t>
+            </a:r>
+            <a:r>
+              <a:rPr lang="en-US" sz="1800" dirty="0">
+                <a:solidFill>
+                  <a:srgbClr val="000000"/>
+                </a:solidFill>
+              </a:rPr>
+              <a:t> code, gives passage data to the </a:t>
+            </a:r>
+            <a:r>
+              <a:rPr lang="en-US" sz="1800" dirty="0" err="1">
+                <a:solidFill>
+                  <a:srgbClr val="000000"/>
+                </a:solidFill>
+              </a:rPr>
+              <a:t>heccer</a:t>
+            </a:r>
+            <a:r>
+              <a:rPr lang="en-US" sz="1800" dirty="0">
+                <a:solidFill>
+                  <a:srgbClr val="000000"/>
+                </a:solidFill>
+              </a:rPr>
+              <a:t>.</a:t>
+            </a:r>
           </a:p>
           <a:p>
             <a:endParaRPr lang="en-US" sz="2600" dirty="0">

</xml_diff>

<commit_message>
here's some stuff that was generated during the presentation
</commit_message>
<xml_diff>
--- a/Reports n such/Week 11 Presentation.pptx
+++ b/Reports n such/Week 11 Presentation.pptx
@@ -135,7 +135,7 @@
 <file path=ppt/revisionInfo.xml><?xml version="1.0" encoding="utf-8"?>
 <p1510:revInfo xmlns:a="http://schemas.openxmlformats.org/drawingml/2006/main" xmlns:r="http://schemas.openxmlformats.org/officeDocument/2006/relationships" xmlns:p1510="http://schemas.microsoft.com/office/powerpoint/2015/10/main">
   <p1510:revLst>
-    <p1510:client id="{5D77B04D-72D2-4F2E-9530-A9549410DFC4}" v="1669" dt="2020-12-16T12:38:47.696"/>
+    <p1510:client id="{5D77B04D-72D2-4F2E-9530-A9549410DFC4}" v="1670" dt="2020-12-16T12:58:31.890"/>
   </p1510:revLst>
 </p1510:revInfo>
 </file>
@@ -145,7 +145,7 @@
   <pc:docChgLst>
     <pc:chgData name="Lowe, Rachel M" userId="93b75d29-27f6-4dab-b540-bade7f33a1ad" providerId="ADAL" clId="{5D77B04D-72D2-4F2E-9530-A9549410DFC4}"/>
     <pc:docChg chg="undo redo custSel mod addSld delSld modSld sldOrd">
-      <pc:chgData name="Lowe, Rachel M" userId="93b75d29-27f6-4dab-b540-bade7f33a1ad" providerId="ADAL" clId="{5D77B04D-72D2-4F2E-9530-A9549410DFC4}" dt="2020-12-16T12:38:47.696" v="15558"/>
+      <pc:chgData name="Lowe, Rachel M" userId="93b75d29-27f6-4dab-b540-bade7f33a1ad" providerId="ADAL" clId="{5D77B04D-72D2-4F2E-9530-A9549410DFC4}" dt="2020-12-16T12:58:31.889" v="15559" actId="20577"/>
       <pc:docMkLst>
         <pc:docMk/>
       </pc:docMkLst>
@@ -547,7 +547,7 @@
         </pc:spChg>
       </pc:sldChg>
       <pc:sldChg chg="modSp add modAnim">
-        <pc:chgData name="Lowe, Rachel M" userId="93b75d29-27f6-4dab-b540-bade7f33a1ad" providerId="ADAL" clId="{5D77B04D-72D2-4F2E-9530-A9549410DFC4}" dt="2020-12-16T12:23:53.894" v="15401"/>
+        <pc:chgData name="Lowe, Rachel M" userId="93b75d29-27f6-4dab-b540-bade7f33a1ad" providerId="ADAL" clId="{5D77B04D-72D2-4F2E-9530-A9549410DFC4}" dt="2020-12-16T12:58:31.889" v="15559" actId="20577"/>
         <pc:sldMkLst>
           <pc:docMk/>
           <pc:sldMk cId="1407993548" sldId="267"/>
@@ -561,7 +561,7 @@
           </ac:spMkLst>
         </pc:spChg>
         <pc:spChg chg="mod">
-          <ac:chgData name="Lowe, Rachel M" userId="93b75d29-27f6-4dab-b540-bade7f33a1ad" providerId="ADAL" clId="{5D77B04D-72D2-4F2E-9530-A9549410DFC4}" dt="2020-12-16T12:23:39.004" v="15397" actId="27636"/>
+          <ac:chgData name="Lowe, Rachel M" userId="93b75d29-27f6-4dab-b540-bade7f33a1ad" providerId="ADAL" clId="{5D77B04D-72D2-4F2E-9530-A9549410DFC4}" dt="2020-12-16T12:58:31.889" v="15559" actId="20577"/>
           <ac:spMkLst>
             <pc:docMk/>
             <pc:sldMk cId="1407993548" sldId="267"/>
@@ -8936,8 +8936,12 @@
           <a:p>
             <a:pPr lvl="1"/>
             <a:r>
+              <a:rPr lang="en-GB"/>
+              <a:t>154 </a:t>
+            </a:r>
+            <a:r>
               <a:rPr lang="en-GB" dirty="0"/>
-              <a:t>155 commits as of 16/12/20</a:t>
+              <a:t>commits as of 16/12/20</a:t>
             </a:r>
           </a:p>
           <a:p>

</xml_diff>